<commit_message>
Added fanin, fanout, circular_transaction diagram.
</commit_message>
<xml_diff>
--- a/Kate/diagrams.pptx
+++ b/Kate/diagrams.pptx
@@ -6,6 +6,9 @@
   </p:sldMasterIdLst>
   <p:sldIdLst>
     <p:sldId id="256" r:id="rId2"/>
+    <p:sldId id="257" r:id="rId3"/>
+    <p:sldId id="258" r:id="rId4"/>
+    <p:sldId id="259" r:id="rId5"/>
   </p:sldIdLst>
   <p:sldSz cx="4572000" cy="5486400"/>
   <p:notesSz cx="6858000" cy="9144000"/>
@@ -104,6 +107,11 @@
       </a:defRPr>
     </a:lvl9pPr>
   </p:defaultTextStyle>
+  <p:extLst>
+    <p:ext uri="{EFAFB233-063F-42B5-8137-9DF3F51BA10A}">
+      <p15:sldGuideLst xmlns:p15="http://schemas.microsoft.com/office/powerpoint/2012/main"/>
+    </p:ext>
+  </p:extLst>
 </p:presentation>
 </file>
 
@@ -238,7 +246,7 @@
           <a:p>
             <a:fld id="{1A01868C-B13A-47E7-85E7-2E63E1B5F28E}" type="datetimeFigureOut">
               <a:rPr lang="en-US" smtClean="0"/>
-              <a:t>10/27/2025</a:t>
+              <a:t>10/28/2025</a:t>
             </a:fld>
             <a:endParaRPr lang="en-US"/>
           </a:p>
@@ -408,7 +416,7 @@
           <a:p>
             <a:fld id="{1A01868C-B13A-47E7-85E7-2E63E1B5F28E}" type="datetimeFigureOut">
               <a:rPr lang="en-US" smtClean="0"/>
-              <a:t>10/27/2025</a:t>
+              <a:t>10/28/2025</a:t>
             </a:fld>
             <a:endParaRPr lang="en-US"/>
           </a:p>
@@ -588,7 +596,7 @@
           <a:p>
             <a:fld id="{1A01868C-B13A-47E7-85E7-2E63E1B5F28E}" type="datetimeFigureOut">
               <a:rPr lang="en-US" smtClean="0"/>
-              <a:t>10/27/2025</a:t>
+              <a:t>10/28/2025</a:t>
             </a:fld>
             <a:endParaRPr lang="en-US"/>
           </a:p>
@@ -758,7 +766,7 @@
           <a:p>
             <a:fld id="{1A01868C-B13A-47E7-85E7-2E63E1B5F28E}" type="datetimeFigureOut">
               <a:rPr lang="en-US" smtClean="0"/>
-              <a:t>10/27/2025</a:t>
+              <a:t>10/28/2025</a:t>
             </a:fld>
             <a:endParaRPr lang="en-US"/>
           </a:p>
@@ -1002,7 +1010,7 @@
           <a:p>
             <a:fld id="{1A01868C-B13A-47E7-85E7-2E63E1B5F28E}" type="datetimeFigureOut">
               <a:rPr lang="en-US" smtClean="0"/>
-              <a:t>10/27/2025</a:t>
+              <a:t>10/28/2025</a:t>
             </a:fld>
             <a:endParaRPr lang="en-US"/>
           </a:p>
@@ -1234,7 +1242,7 @@
           <a:p>
             <a:fld id="{1A01868C-B13A-47E7-85E7-2E63E1B5F28E}" type="datetimeFigureOut">
               <a:rPr lang="en-US" smtClean="0"/>
-              <a:t>10/27/2025</a:t>
+              <a:t>10/28/2025</a:t>
             </a:fld>
             <a:endParaRPr lang="en-US"/>
           </a:p>
@@ -1601,7 +1609,7 @@
           <a:p>
             <a:fld id="{1A01868C-B13A-47E7-85E7-2E63E1B5F28E}" type="datetimeFigureOut">
               <a:rPr lang="en-US" smtClean="0"/>
-              <a:t>10/27/2025</a:t>
+              <a:t>10/28/2025</a:t>
             </a:fld>
             <a:endParaRPr lang="en-US"/>
           </a:p>
@@ -1719,7 +1727,7 @@
           <a:p>
             <a:fld id="{1A01868C-B13A-47E7-85E7-2E63E1B5F28E}" type="datetimeFigureOut">
               <a:rPr lang="en-US" smtClean="0"/>
-              <a:t>10/27/2025</a:t>
+              <a:t>10/28/2025</a:t>
             </a:fld>
             <a:endParaRPr lang="en-US"/>
           </a:p>
@@ -1814,7 +1822,7 @@
           <a:p>
             <a:fld id="{1A01868C-B13A-47E7-85E7-2E63E1B5F28E}" type="datetimeFigureOut">
               <a:rPr lang="en-US" smtClean="0"/>
-              <a:t>10/27/2025</a:t>
+              <a:t>10/28/2025</a:t>
             </a:fld>
             <a:endParaRPr lang="en-US"/>
           </a:p>
@@ -2091,7 +2099,7 @@
           <a:p>
             <a:fld id="{1A01868C-B13A-47E7-85E7-2E63E1B5F28E}" type="datetimeFigureOut">
               <a:rPr lang="en-US" smtClean="0"/>
-              <a:t>10/27/2025</a:t>
+              <a:t>10/28/2025</a:t>
             </a:fld>
             <a:endParaRPr lang="en-US"/>
           </a:p>
@@ -2348,7 +2356,7 @@
           <a:p>
             <a:fld id="{1A01868C-B13A-47E7-85E7-2E63E1B5F28E}" type="datetimeFigureOut">
               <a:rPr lang="en-US" smtClean="0"/>
-              <a:t>10/27/2025</a:t>
+              <a:t>10/28/2025</a:t>
             </a:fld>
             <a:endParaRPr lang="en-US"/>
           </a:p>
@@ -2561,7 +2569,7 @@
           <a:p>
             <a:fld id="{1A01868C-B13A-47E7-85E7-2E63E1B5F28E}" type="datetimeFigureOut">
               <a:rPr lang="en-US" smtClean="0"/>
-              <a:t>10/27/2025</a:t>
+              <a:t>10/28/2025</a:t>
             </a:fld>
             <a:endParaRPr lang="en-US"/>
           </a:p>
@@ -3804,6 +3812,1200 @@
 </p:sld>
 </file>
 
+<file path=ppt/slides/slide2.xml><?xml version="1.0" encoding="utf-8"?>
+<p:sld xmlns:a="http://schemas.openxmlformats.org/drawingml/2006/main" xmlns:r="http://schemas.openxmlformats.org/officeDocument/2006/relationships" xmlns:p="http://schemas.openxmlformats.org/presentationml/2006/main">
+  <p:cSld>
+    <p:spTree>
+      <p:nvGrpSpPr>
+        <p:cNvPr id="1" name=""/>
+        <p:cNvGrpSpPr/>
+        <p:nvPr/>
+      </p:nvGrpSpPr>
+      <p:grpSpPr>
+        <a:xfrm>
+          <a:off x="0" y="0"/>
+          <a:ext cx="0" cy="0"/>
+          <a:chOff x="0" y="0"/>
+          <a:chExt cx="0" cy="0"/>
+        </a:xfrm>
+      </p:grpSpPr>
+      <p:sp>
+        <p:nvSpPr>
+          <p:cNvPr id="4" name="Oval 3"/>
+          <p:cNvSpPr/>
+          <p:nvPr/>
+        </p:nvSpPr>
+        <p:spPr>
+          <a:xfrm>
+            <a:off x="493407" y="2045074"/>
+            <a:ext cx="770374" cy="770374"/>
+          </a:xfrm>
+          <a:prstGeom prst="ellipse">
+            <a:avLst/>
+          </a:prstGeom>
+        </p:spPr>
+        <p:style>
+          <a:lnRef idx="2">
+            <a:schemeClr val="accent1">
+              <a:shade val="50000"/>
+            </a:schemeClr>
+          </a:lnRef>
+          <a:fillRef idx="1">
+            <a:schemeClr val="accent1"/>
+          </a:fillRef>
+          <a:effectRef idx="0">
+            <a:schemeClr val="accent1"/>
+          </a:effectRef>
+          <a:fontRef idx="minor">
+            <a:schemeClr val="lt1"/>
+          </a:fontRef>
+        </p:style>
+        <p:txBody>
+          <a:bodyPr rtlCol="0" anchor="ctr"/>
+          <a:lstStyle/>
+          <a:p>
+            <a:pPr algn="ctr"/>
+            <a:endParaRPr lang="en-US"/>
+          </a:p>
+        </p:txBody>
+      </p:sp>
+      <p:sp>
+        <p:nvSpPr>
+          <p:cNvPr id="5" name="Oval 4"/>
+          <p:cNvSpPr/>
+          <p:nvPr/>
+        </p:nvSpPr>
+        <p:spPr>
+          <a:xfrm>
+            <a:off x="2675575" y="713667"/>
+            <a:ext cx="770374" cy="770374"/>
+          </a:xfrm>
+          <a:prstGeom prst="ellipse">
+            <a:avLst/>
+          </a:prstGeom>
+          <a:solidFill>
+            <a:schemeClr val="bg1"/>
+          </a:solidFill>
+          <a:ln w="28575">
+            <a:solidFill>
+              <a:schemeClr val="tx1"/>
+            </a:solidFill>
+          </a:ln>
+        </p:spPr>
+        <p:style>
+          <a:lnRef idx="2">
+            <a:schemeClr val="accent1">
+              <a:shade val="50000"/>
+            </a:schemeClr>
+          </a:lnRef>
+          <a:fillRef idx="1">
+            <a:schemeClr val="accent1"/>
+          </a:fillRef>
+          <a:effectRef idx="0">
+            <a:schemeClr val="accent1"/>
+          </a:effectRef>
+          <a:fontRef idx="minor">
+            <a:schemeClr val="lt1"/>
+          </a:fontRef>
+        </p:style>
+        <p:txBody>
+          <a:bodyPr rtlCol="0" anchor="ctr"/>
+          <a:lstStyle/>
+          <a:p>
+            <a:pPr algn="ctr"/>
+            <a:endParaRPr lang="en-US"/>
+          </a:p>
+        </p:txBody>
+      </p:sp>
+      <p:sp>
+        <p:nvSpPr>
+          <p:cNvPr id="9" name="Oval 8"/>
+          <p:cNvSpPr/>
+          <p:nvPr/>
+        </p:nvSpPr>
+        <p:spPr>
+          <a:xfrm>
+            <a:off x="2675575" y="2045074"/>
+            <a:ext cx="770374" cy="770374"/>
+          </a:xfrm>
+          <a:prstGeom prst="ellipse">
+            <a:avLst/>
+          </a:prstGeom>
+          <a:solidFill>
+            <a:schemeClr val="bg1"/>
+          </a:solidFill>
+          <a:ln w="28575">
+            <a:solidFill>
+              <a:schemeClr val="tx1"/>
+            </a:solidFill>
+          </a:ln>
+        </p:spPr>
+        <p:style>
+          <a:lnRef idx="2">
+            <a:schemeClr val="accent1">
+              <a:shade val="50000"/>
+            </a:schemeClr>
+          </a:lnRef>
+          <a:fillRef idx="1">
+            <a:schemeClr val="accent1"/>
+          </a:fillRef>
+          <a:effectRef idx="0">
+            <a:schemeClr val="accent1"/>
+          </a:effectRef>
+          <a:fontRef idx="minor">
+            <a:schemeClr val="lt1"/>
+          </a:fontRef>
+        </p:style>
+        <p:txBody>
+          <a:bodyPr rtlCol="0" anchor="ctr"/>
+          <a:lstStyle/>
+          <a:p>
+            <a:pPr algn="ctr"/>
+            <a:endParaRPr lang="en-US"/>
+          </a:p>
+        </p:txBody>
+      </p:sp>
+      <p:sp>
+        <p:nvSpPr>
+          <p:cNvPr id="10" name="Oval 9"/>
+          <p:cNvSpPr/>
+          <p:nvPr/>
+        </p:nvSpPr>
+        <p:spPr>
+          <a:xfrm>
+            <a:off x="2675575" y="3555676"/>
+            <a:ext cx="770374" cy="770374"/>
+          </a:xfrm>
+          <a:prstGeom prst="ellipse">
+            <a:avLst/>
+          </a:prstGeom>
+          <a:solidFill>
+            <a:schemeClr val="bg1"/>
+          </a:solidFill>
+          <a:ln w="28575">
+            <a:solidFill>
+              <a:schemeClr val="tx1"/>
+            </a:solidFill>
+          </a:ln>
+        </p:spPr>
+        <p:style>
+          <a:lnRef idx="2">
+            <a:schemeClr val="accent1">
+              <a:shade val="50000"/>
+            </a:schemeClr>
+          </a:lnRef>
+          <a:fillRef idx="1">
+            <a:schemeClr val="accent1"/>
+          </a:fillRef>
+          <a:effectRef idx="0">
+            <a:schemeClr val="accent1"/>
+          </a:effectRef>
+          <a:fontRef idx="minor">
+            <a:schemeClr val="lt1"/>
+          </a:fontRef>
+        </p:style>
+        <p:txBody>
+          <a:bodyPr rtlCol="0" anchor="ctr"/>
+          <a:lstStyle/>
+          <a:p>
+            <a:pPr algn="ctr"/>
+            <a:endParaRPr lang="en-US"/>
+          </a:p>
+        </p:txBody>
+      </p:sp>
+      <p:cxnSp>
+        <p:nvCxnSpPr>
+          <p:cNvPr id="12" name="Straight Arrow Connector 11"/>
+          <p:cNvCxnSpPr>
+            <a:stCxn id="4" idx="7"/>
+            <a:endCxn id="5" idx="2"/>
+          </p:cNvCxnSpPr>
+          <p:nvPr/>
+        </p:nvCxnSpPr>
+        <p:spPr>
+          <a:xfrm flipV="1">
+            <a:off x="1150962" y="1098854"/>
+            <a:ext cx="1524613" cy="1059039"/>
+          </a:xfrm>
+          <a:prstGeom prst="straightConnector1">
+            <a:avLst/>
+          </a:prstGeom>
+          <a:ln w="28575">
+            <a:solidFill>
+              <a:schemeClr val="tx1"/>
+            </a:solidFill>
+            <a:tailEnd type="triangle"/>
+          </a:ln>
+        </p:spPr>
+        <p:style>
+          <a:lnRef idx="1">
+            <a:schemeClr val="accent1"/>
+          </a:lnRef>
+          <a:fillRef idx="0">
+            <a:schemeClr val="accent1"/>
+          </a:fillRef>
+          <a:effectRef idx="0">
+            <a:schemeClr val="accent1"/>
+          </a:effectRef>
+          <a:fontRef idx="minor">
+            <a:schemeClr val="tx1"/>
+          </a:fontRef>
+        </p:style>
+      </p:cxnSp>
+      <p:cxnSp>
+        <p:nvCxnSpPr>
+          <p:cNvPr id="14" name="Straight Arrow Connector 13"/>
+          <p:cNvCxnSpPr>
+            <a:endCxn id="9" idx="2"/>
+          </p:cNvCxnSpPr>
+          <p:nvPr/>
+        </p:nvCxnSpPr>
+        <p:spPr>
+          <a:xfrm flipV="1">
+            <a:off x="1263781" y="2430261"/>
+            <a:ext cx="1411794" cy="1"/>
+          </a:xfrm>
+          <a:prstGeom prst="straightConnector1">
+            <a:avLst/>
+          </a:prstGeom>
+          <a:ln w="28575">
+            <a:solidFill>
+              <a:schemeClr val="tx1"/>
+            </a:solidFill>
+            <a:tailEnd type="triangle"/>
+          </a:ln>
+        </p:spPr>
+        <p:style>
+          <a:lnRef idx="1">
+            <a:schemeClr val="accent1"/>
+          </a:lnRef>
+          <a:fillRef idx="0">
+            <a:schemeClr val="accent1"/>
+          </a:fillRef>
+          <a:effectRef idx="0">
+            <a:schemeClr val="accent1"/>
+          </a:effectRef>
+          <a:fontRef idx="minor">
+            <a:schemeClr val="tx1"/>
+          </a:fontRef>
+        </p:style>
+      </p:cxnSp>
+      <p:cxnSp>
+        <p:nvCxnSpPr>
+          <p:cNvPr id="16" name="Straight Arrow Connector 15"/>
+          <p:cNvCxnSpPr>
+            <a:stCxn id="4" idx="5"/>
+            <a:endCxn id="10" idx="2"/>
+          </p:cNvCxnSpPr>
+          <p:nvPr/>
+        </p:nvCxnSpPr>
+        <p:spPr>
+          <a:xfrm>
+            <a:off x="1150962" y="2702629"/>
+            <a:ext cx="1524613" cy="1238234"/>
+          </a:xfrm>
+          <a:prstGeom prst="straightConnector1">
+            <a:avLst/>
+          </a:prstGeom>
+          <a:ln w="28575">
+            <a:solidFill>
+              <a:schemeClr val="tx1"/>
+            </a:solidFill>
+            <a:tailEnd type="triangle"/>
+          </a:ln>
+        </p:spPr>
+        <p:style>
+          <a:lnRef idx="1">
+            <a:schemeClr val="accent1"/>
+          </a:lnRef>
+          <a:fillRef idx="0">
+            <a:schemeClr val="accent1"/>
+          </a:fillRef>
+          <a:effectRef idx="0">
+            <a:schemeClr val="accent1"/>
+          </a:effectRef>
+          <a:fontRef idx="minor">
+            <a:schemeClr val="tx1"/>
+          </a:fontRef>
+        </p:style>
+      </p:cxnSp>
+    </p:spTree>
+    <p:extLst>
+      <p:ext uri="{BB962C8B-B14F-4D97-AF65-F5344CB8AC3E}">
+        <p14:creationId xmlns:p14="http://schemas.microsoft.com/office/powerpoint/2010/main" val="1285982533"/>
+      </p:ext>
+    </p:extLst>
+  </p:cSld>
+  <p:clrMapOvr>
+    <a:masterClrMapping/>
+  </p:clrMapOvr>
+</p:sld>
+</file>
+
+<file path=ppt/slides/slide3.xml><?xml version="1.0" encoding="utf-8"?>
+<p:sld xmlns:a="http://schemas.openxmlformats.org/drawingml/2006/main" xmlns:r="http://schemas.openxmlformats.org/officeDocument/2006/relationships" xmlns:p="http://schemas.openxmlformats.org/presentationml/2006/main">
+  <p:cSld>
+    <p:spTree>
+      <p:nvGrpSpPr>
+        <p:cNvPr id="1" name=""/>
+        <p:cNvGrpSpPr/>
+        <p:nvPr/>
+      </p:nvGrpSpPr>
+      <p:grpSpPr>
+        <a:xfrm>
+          <a:off x="0" y="0"/>
+          <a:ext cx="0" cy="0"/>
+          <a:chOff x="0" y="0"/>
+          <a:chExt cx="0" cy="0"/>
+        </a:xfrm>
+      </p:grpSpPr>
+      <p:sp>
+        <p:nvSpPr>
+          <p:cNvPr id="4" name="Oval 3"/>
+          <p:cNvSpPr/>
+          <p:nvPr/>
+        </p:nvSpPr>
+        <p:spPr>
+          <a:xfrm>
+            <a:off x="3011158" y="2260878"/>
+            <a:ext cx="770374" cy="770374"/>
+          </a:xfrm>
+          <a:prstGeom prst="ellipse">
+            <a:avLst/>
+          </a:prstGeom>
+        </p:spPr>
+        <p:style>
+          <a:lnRef idx="2">
+            <a:schemeClr val="accent1">
+              <a:shade val="50000"/>
+            </a:schemeClr>
+          </a:lnRef>
+          <a:fillRef idx="1">
+            <a:schemeClr val="accent1"/>
+          </a:fillRef>
+          <a:effectRef idx="0">
+            <a:schemeClr val="accent1"/>
+          </a:effectRef>
+          <a:fontRef idx="minor">
+            <a:schemeClr val="lt1"/>
+          </a:fontRef>
+        </p:style>
+        <p:txBody>
+          <a:bodyPr rtlCol="0" anchor="ctr"/>
+          <a:lstStyle/>
+          <a:p>
+            <a:pPr algn="ctr"/>
+            <a:endParaRPr lang="en-US"/>
+          </a:p>
+        </p:txBody>
+      </p:sp>
+      <p:sp>
+        <p:nvSpPr>
+          <p:cNvPr id="5" name="Oval 4"/>
+          <p:cNvSpPr/>
+          <p:nvPr/>
+        </p:nvSpPr>
+        <p:spPr>
+          <a:xfrm>
+            <a:off x="817715" y="617972"/>
+            <a:ext cx="770374" cy="770374"/>
+          </a:xfrm>
+          <a:prstGeom prst="ellipse">
+            <a:avLst/>
+          </a:prstGeom>
+          <a:solidFill>
+            <a:schemeClr val="bg1"/>
+          </a:solidFill>
+          <a:ln w="28575">
+            <a:solidFill>
+              <a:schemeClr val="tx1"/>
+            </a:solidFill>
+          </a:ln>
+        </p:spPr>
+        <p:style>
+          <a:lnRef idx="2">
+            <a:schemeClr val="accent1">
+              <a:shade val="50000"/>
+            </a:schemeClr>
+          </a:lnRef>
+          <a:fillRef idx="1">
+            <a:schemeClr val="accent1"/>
+          </a:fillRef>
+          <a:effectRef idx="0">
+            <a:schemeClr val="accent1"/>
+          </a:effectRef>
+          <a:fontRef idx="minor">
+            <a:schemeClr val="lt1"/>
+          </a:fontRef>
+        </p:style>
+        <p:txBody>
+          <a:bodyPr rtlCol="0" anchor="ctr"/>
+          <a:lstStyle/>
+          <a:p>
+            <a:pPr algn="ctr"/>
+            <a:endParaRPr lang="en-US"/>
+          </a:p>
+        </p:txBody>
+      </p:sp>
+      <p:sp>
+        <p:nvSpPr>
+          <p:cNvPr id="9" name="Oval 8"/>
+          <p:cNvSpPr/>
+          <p:nvPr/>
+        </p:nvSpPr>
+        <p:spPr>
+          <a:xfrm>
+            <a:off x="828990" y="2237432"/>
+            <a:ext cx="770374" cy="770374"/>
+          </a:xfrm>
+          <a:prstGeom prst="ellipse">
+            <a:avLst/>
+          </a:prstGeom>
+          <a:solidFill>
+            <a:schemeClr val="bg1"/>
+          </a:solidFill>
+          <a:ln w="28575">
+            <a:solidFill>
+              <a:schemeClr val="tx1"/>
+            </a:solidFill>
+          </a:ln>
+        </p:spPr>
+        <p:style>
+          <a:lnRef idx="2">
+            <a:schemeClr val="accent1">
+              <a:shade val="50000"/>
+            </a:schemeClr>
+          </a:lnRef>
+          <a:fillRef idx="1">
+            <a:schemeClr val="accent1"/>
+          </a:fillRef>
+          <a:effectRef idx="0">
+            <a:schemeClr val="accent1"/>
+          </a:effectRef>
+          <a:fontRef idx="minor">
+            <a:schemeClr val="lt1"/>
+          </a:fontRef>
+        </p:style>
+        <p:txBody>
+          <a:bodyPr rtlCol="0" anchor="ctr"/>
+          <a:lstStyle/>
+          <a:p>
+            <a:pPr algn="ctr"/>
+            <a:endParaRPr lang="en-US"/>
+          </a:p>
+        </p:txBody>
+      </p:sp>
+      <p:sp>
+        <p:nvSpPr>
+          <p:cNvPr id="10" name="Oval 9"/>
+          <p:cNvSpPr/>
+          <p:nvPr/>
+        </p:nvSpPr>
+        <p:spPr>
+          <a:xfrm>
+            <a:off x="828990" y="3748034"/>
+            <a:ext cx="770374" cy="770374"/>
+          </a:xfrm>
+          <a:prstGeom prst="ellipse">
+            <a:avLst/>
+          </a:prstGeom>
+          <a:solidFill>
+            <a:schemeClr val="bg1"/>
+          </a:solidFill>
+          <a:ln w="28575">
+            <a:solidFill>
+              <a:schemeClr val="tx1"/>
+            </a:solidFill>
+          </a:ln>
+        </p:spPr>
+        <p:style>
+          <a:lnRef idx="2">
+            <a:schemeClr val="accent1">
+              <a:shade val="50000"/>
+            </a:schemeClr>
+          </a:lnRef>
+          <a:fillRef idx="1">
+            <a:schemeClr val="accent1"/>
+          </a:fillRef>
+          <a:effectRef idx="0">
+            <a:schemeClr val="accent1"/>
+          </a:effectRef>
+          <a:fontRef idx="minor">
+            <a:schemeClr val="lt1"/>
+          </a:fontRef>
+        </p:style>
+        <p:txBody>
+          <a:bodyPr rtlCol="0" anchor="ctr"/>
+          <a:lstStyle/>
+          <a:p>
+            <a:pPr algn="ctr"/>
+            <a:endParaRPr lang="en-US"/>
+          </a:p>
+        </p:txBody>
+      </p:sp>
+      <p:cxnSp>
+        <p:nvCxnSpPr>
+          <p:cNvPr id="12" name="Straight Arrow Connector 11"/>
+          <p:cNvCxnSpPr/>
+          <p:nvPr/>
+        </p:nvCxnSpPr>
+        <p:spPr>
+          <a:xfrm flipV="1">
+            <a:off x="1588089" y="2924070"/>
+            <a:ext cx="1524613" cy="1059039"/>
+          </a:xfrm>
+          <a:prstGeom prst="straightConnector1">
+            <a:avLst/>
+          </a:prstGeom>
+          <a:ln w="28575">
+            <a:solidFill>
+              <a:schemeClr val="tx1"/>
+            </a:solidFill>
+            <a:tailEnd type="triangle"/>
+          </a:ln>
+        </p:spPr>
+        <p:style>
+          <a:lnRef idx="1">
+            <a:schemeClr val="accent1"/>
+          </a:lnRef>
+          <a:fillRef idx="0">
+            <a:schemeClr val="accent1"/>
+          </a:fillRef>
+          <a:effectRef idx="0">
+            <a:schemeClr val="accent1"/>
+          </a:effectRef>
+          <a:fontRef idx="minor">
+            <a:schemeClr val="tx1"/>
+          </a:fontRef>
+        </p:style>
+      </p:cxnSp>
+      <p:cxnSp>
+        <p:nvCxnSpPr>
+          <p:cNvPr id="14" name="Straight Arrow Connector 13"/>
+          <p:cNvCxnSpPr/>
+          <p:nvPr/>
+        </p:nvCxnSpPr>
+        <p:spPr>
+          <a:xfrm flipV="1">
+            <a:off x="1599364" y="2622618"/>
+            <a:ext cx="1411794" cy="1"/>
+          </a:xfrm>
+          <a:prstGeom prst="straightConnector1">
+            <a:avLst/>
+          </a:prstGeom>
+          <a:ln w="28575">
+            <a:solidFill>
+              <a:schemeClr val="tx1"/>
+            </a:solidFill>
+            <a:tailEnd type="triangle"/>
+          </a:ln>
+        </p:spPr>
+        <p:style>
+          <a:lnRef idx="1">
+            <a:schemeClr val="accent1"/>
+          </a:lnRef>
+          <a:fillRef idx="0">
+            <a:schemeClr val="accent1"/>
+          </a:fillRef>
+          <a:effectRef idx="0">
+            <a:schemeClr val="accent1"/>
+          </a:effectRef>
+          <a:fontRef idx="minor">
+            <a:schemeClr val="tx1"/>
+          </a:fontRef>
+        </p:style>
+      </p:cxnSp>
+      <p:cxnSp>
+        <p:nvCxnSpPr>
+          <p:cNvPr id="16" name="Straight Arrow Connector 15"/>
+          <p:cNvCxnSpPr/>
+          <p:nvPr/>
+        </p:nvCxnSpPr>
+        <p:spPr>
+          <a:xfrm>
+            <a:off x="1542955" y="1193772"/>
+            <a:ext cx="1524613" cy="1238234"/>
+          </a:xfrm>
+          <a:prstGeom prst="straightConnector1">
+            <a:avLst/>
+          </a:prstGeom>
+          <a:ln w="28575">
+            <a:solidFill>
+              <a:schemeClr val="tx1"/>
+            </a:solidFill>
+            <a:tailEnd type="triangle"/>
+          </a:ln>
+        </p:spPr>
+        <p:style>
+          <a:lnRef idx="1">
+            <a:schemeClr val="accent1"/>
+          </a:lnRef>
+          <a:fillRef idx="0">
+            <a:schemeClr val="accent1"/>
+          </a:fillRef>
+          <a:effectRef idx="0">
+            <a:schemeClr val="accent1"/>
+          </a:effectRef>
+          <a:fontRef idx="minor">
+            <a:schemeClr val="tx1"/>
+          </a:fontRef>
+        </p:style>
+      </p:cxnSp>
+    </p:spTree>
+    <p:extLst>
+      <p:ext uri="{BB962C8B-B14F-4D97-AF65-F5344CB8AC3E}">
+        <p14:creationId xmlns:p14="http://schemas.microsoft.com/office/powerpoint/2010/main" val="3094838938"/>
+      </p:ext>
+    </p:extLst>
+  </p:cSld>
+  <p:clrMapOvr>
+    <a:masterClrMapping/>
+  </p:clrMapOvr>
+</p:sld>
+</file>
+
+<file path=ppt/slides/slide4.xml><?xml version="1.0" encoding="utf-8"?>
+<p:sld xmlns:a="http://schemas.openxmlformats.org/drawingml/2006/main" xmlns:r="http://schemas.openxmlformats.org/officeDocument/2006/relationships" xmlns:p="http://schemas.openxmlformats.org/presentationml/2006/main">
+  <p:cSld>
+    <p:spTree>
+      <p:nvGrpSpPr>
+        <p:cNvPr id="1" name=""/>
+        <p:cNvGrpSpPr/>
+        <p:nvPr/>
+      </p:nvGrpSpPr>
+      <p:grpSpPr>
+        <a:xfrm>
+          <a:off x="0" y="0"/>
+          <a:ext cx="0" cy="0"/>
+          <a:chOff x="0" y="0"/>
+          <a:chExt cx="0" cy="0"/>
+        </a:xfrm>
+      </p:grpSpPr>
+      <p:sp>
+        <p:nvSpPr>
+          <p:cNvPr id="9" name="Oval 8"/>
+          <p:cNvSpPr/>
+          <p:nvPr/>
+        </p:nvSpPr>
+        <p:spPr>
+          <a:xfrm>
+            <a:off x="1104093" y="1543258"/>
+            <a:ext cx="2389833" cy="2389833"/>
+          </a:xfrm>
+          <a:prstGeom prst="ellipse">
+            <a:avLst/>
+          </a:prstGeom>
+          <a:solidFill>
+            <a:schemeClr val="bg1"/>
+          </a:solidFill>
+          <a:ln w="28575">
+            <a:solidFill>
+              <a:schemeClr val="tx1"/>
+            </a:solidFill>
+          </a:ln>
+        </p:spPr>
+        <p:style>
+          <a:lnRef idx="2">
+            <a:schemeClr val="accent1">
+              <a:shade val="50000"/>
+            </a:schemeClr>
+          </a:lnRef>
+          <a:fillRef idx="1">
+            <a:schemeClr val="accent1"/>
+          </a:fillRef>
+          <a:effectRef idx="0">
+            <a:schemeClr val="accent1"/>
+          </a:effectRef>
+          <a:fontRef idx="minor">
+            <a:schemeClr val="lt1"/>
+          </a:fontRef>
+        </p:style>
+        <p:txBody>
+          <a:bodyPr rtlCol="0" anchor="ctr"/>
+          <a:lstStyle/>
+          <a:p>
+            <a:pPr algn="ctr"/>
+            <a:endParaRPr lang="en-US"/>
+          </a:p>
+        </p:txBody>
+      </p:sp>
+      <p:sp>
+        <p:nvSpPr>
+          <p:cNvPr id="5" name="Oval 4"/>
+          <p:cNvSpPr/>
+          <p:nvPr/>
+        </p:nvSpPr>
+        <p:spPr>
+          <a:xfrm>
+            <a:off x="1913822" y="1158071"/>
+            <a:ext cx="770374" cy="770374"/>
+          </a:xfrm>
+          <a:prstGeom prst="ellipse">
+            <a:avLst/>
+          </a:prstGeom>
+        </p:spPr>
+        <p:style>
+          <a:lnRef idx="2">
+            <a:schemeClr val="accent1">
+              <a:shade val="50000"/>
+            </a:schemeClr>
+          </a:lnRef>
+          <a:fillRef idx="1">
+            <a:schemeClr val="accent1"/>
+          </a:fillRef>
+          <a:effectRef idx="0">
+            <a:schemeClr val="accent1"/>
+          </a:effectRef>
+          <a:fontRef idx="minor">
+            <a:schemeClr val="lt1"/>
+          </a:fontRef>
+        </p:style>
+        <p:txBody>
+          <a:bodyPr rtlCol="0" anchor="ctr"/>
+          <a:lstStyle/>
+          <a:p>
+            <a:pPr algn="ctr"/>
+            <a:endParaRPr lang="en-US"/>
+          </a:p>
+        </p:txBody>
+      </p:sp>
+      <p:sp>
+        <p:nvSpPr>
+          <p:cNvPr id="6" name="Oval 5"/>
+          <p:cNvSpPr/>
+          <p:nvPr/>
+        </p:nvSpPr>
+        <p:spPr>
+          <a:xfrm>
+            <a:off x="3028352" y="2352987"/>
+            <a:ext cx="770374" cy="770374"/>
+          </a:xfrm>
+          <a:prstGeom prst="ellipse">
+            <a:avLst/>
+          </a:prstGeom>
+          <a:solidFill>
+            <a:schemeClr val="bg1"/>
+          </a:solidFill>
+          <a:ln w="28575">
+            <a:solidFill>
+              <a:schemeClr val="tx1"/>
+            </a:solidFill>
+          </a:ln>
+        </p:spPr>
+        <p:style>
+          <a:lnRef idx="2">
+            <a:schemeClr val="accent1">
+              <a:shade val="50000"/>
+            </a:schemeClr>
+          </a:lnRef>
+          <a:fillRef idx="1">
+            <a:schemeClr val="accent1"/>
+          </a:fillRef>
+          <a:effectRef idx="0">
+            <a:schemeClr val="accent1"/>
+          </a:effectRef>
+          <a:fontRef idx="minor">
+            <a:schemeClr val="lt1"/>
+          </a:fontRef>
+        </p:style>
+        <p:txBody>
+          <a:bodyPr rtlCol="0" anchor="ctr"/>
+          <a:lstStyle/>
+          <a:p>
+            <a:pPr algn="ctr"/>
+            <a:endParaRPr lang="en-US"/>
+          </a:p>
+        </p:txBody>
+      </p:sp>
+      <p:sp>
+        <p:nvSpPr>
+          <p:cNvPr id="7" name="Oval 6"/>
+          <p:cNvSpPr/>
+          <p:nvPr/>
+        </p:nvSpPr>
+        <p:spPr>
+          <a:xfrm>
+            <a:off x="1858947" y="3449933"/>
+            <a:ext cx="770374" cy="770374"/>
+          </a:xfrm>
+          <a:prstGeom prst="ellipse">
+            <a:avLst/>
+          </a:prstGeom>
+          <a:solidFill>
+            <a:schemeClr val="bg1"/>
+          </a:solidFill>
+          <a:ln w="28575">
+            <a:solidFill>
+              <a:schemeClr val="tx1"/>
+            </a:solidFill>
+          </a:ln>
+        </p:spPr>
+        <p:style>
+          <a:lnRef idx="2">
+            <a:schemeClr val="accent1">
+              <a:shade val="50000"/>
+            </a:schemeClr>
+          </a:lnRef>
+          <a:fillRef idx="1">
+            <a:schemeClr val="accent1"/>
+          </a:fillRef>
+          <a:effectRef idx="0">
+            <a:schemeClr val="accent1"/>
+          </a:effectRef>
+          <a:fontRef idx="minor">
+            <a:schemeClr val="lt1"/>
+          </a:fontRef>
+        </p:style>
+        <p:txBody>
+          <a:bodyPr rtlCol="0" anchor="ctr"/>
+          <a:lstStyle/>
+          <a:p>
+            <a:pPr algn="ctr"/>
+            <a:endParaRPr lang="en-US"/>
+          </a:p>
+        </p:txBody>
+      </p:sp>
+      <p:sp>
+        <p:nvSpPr>
+          <p:cNvPr id="8" name="Oval 7"/>
+          <p:cNvSpPr/>
+          <p:nvPr/>
+        </p:nvSpPr>
+        <p:spPr>
+          <a:xfrm>
+            <a:off x="799293" y="2352987"/>
+            <a:ext cx="770374" cy="770374"/>
+          </a:xfrm>
+          <a:prstGeom prst="ellipse">
+            <a:avLst/>
+          </a:prstGeom>
+          <a:solidFill>
+            <a:schemeClr val="bg1"/>
+          </a:solidFill>
+          <a:ln w="28575">
+            <a:solidFill>
+              <a:schemeClr val="tx1"/>
+            </a:solidFill>
+          </a:ln>
+        </p:spPr>
+        <p:style>
+          <a:lnRef idx="2">
+            <a:schemeClr val="accent1">
+              <a:shade val="50000"/>
+            </a:schemeClr>
+          </a:lnRef>
+          <a:fillRef idx="1">
+            <a:schemeClr val="accent1"/>
+          </a:fillRef>
+          <a:effectRef idx="0">
+            <a:schemeClr val="accent1"/>
+          </a:effectRef>
+          <a:fontRef idx="minor">
+            <a:schemeClr val="lt1"/>
+          </a:fontRef>
+        </p:style>
+        <p:txBody>
+          <a:bodyPr rtlCol="0" anchor="ctr"/>
+          <a:lstStyle/>
+          <a:p>
+            <a:pPr algn="ctr"/>
+            <a:endParaRPr lang="en-US"/>
+          </a:p>
+        </p:txBody>
+      </p:sp>
+      <p:cxnSp>
+        <p:nvCxnSpPr>
+          <p:cNvPr id="11" name="Straight Connector 10"/>
+          <p:cNvCxnSpPr/>
+          <p:nvPr/>
+        </p:nvCxnSpPr>
+        <p:spPr>
+          <a:xfrm flipV="1">
+            <a:off x="3430205" y="2181860"/>
+            <a:ext cx="80387" cy="153347"/>
+          </a:xfrm>
+          <a:prstGeom prst="line">
+            <a:avLst/>
+          </a:prstGeom>
+          <a:ln w="28575">
+            <a:solidFill>
+              <a:schemeClr val="tx1"/>
+            </a:solidFill>
+          </a:ln>
+        </p:spPr>
+        <p:style>
+          <a:lnRef idx="1">
+            <a:schemeClr val="accent1"/>
+          </a:lnRef>
+          <a:fillRef idx="0">
+            <a:schemeClr val="accent1"/>
+          </a:fillRef>
+          <a:effectRef idx="0">
+            <a:schemeClr val="accent1"/>
+          </a:effectRef>
+          <a:fontRef idx="minor">
+            <a:schemeClr val="tx1"/>
+          </a:fontRef>
+        </p:style>
+      </p:cxnSp>
+      <p:cxnSp>
+        <p:nvCxnSpPr>
+          <p:cNvPr id="12" name="Straight Connector 11"/>
+          <p:cNvCxnSpPr/>
+          <p:nvPr/>
+        </p:nvCxnSpPr>
+        <p:spPr>
+          <a:xfrm flipH="1" flipV="1">
+            <a:off x="3258820" y="2267424"/>
+            <a:ext cx="154719" cy="67784"/>
+          </a:xfrm>
+          <a:prstGeom prst="line">
+            <a:avLst/>
+          </a:prstGeom>
+          <a:ln w="28575">
+            <a:solidFill>
+              <a:schemeClr val="tx1"/>
+            </a:solidFill>
+          </a:ln>
+        </p:spPr>
+        <p:style>
+          <a:lnRef idx="1">
+            <a:schemeClr val="accent1"/>
+          </a:lnRef>
+          <a:fillRef idx="0">
+            <a:schemeClr val="accent1"/>
+          </a:fillRef>
+          <a:effectRef idx="0">
+            <a:schemeClr val="accent1"/>
+          </a:effectRef>
+          <a:fontRef idx="minor">
+            <a:schemeClr val="tx1"/>
+          </a:fontRef>
+        </p:style>
+      </p:cxnSp>
+      <p:cxnSp>
+        <p:nvCxnSpPr>
+          <p:cNvPr id="14" name="Straight Connector 13"/>
+          <p:cNvCxnSpPr/>
+          <p:nvPr/>
+        </p:nvCxnSpPr>
+        <p:spPr>
+          <a:xfrm rot="5400000" flipV="1">
+            <a:off x="2666145" y="3856417"/>
+            <a:ext cx="80387" cy="153347"/>
+          </a:xfrm>
+          <a:prstGeom prst="line">
+            <a:avLst/>
+          </a:prstGeom>
+          <a:ln w="28575">
+            <a:solidFill>
+              <a:schemeClr val="tx1"/>
+            </a:solidFill>
+          </a:ln>
+        </p:spPr>
+        <p:style>
+          <a:lnRef idx="1">
+            <a:schemeClr val="accent1"/>
+          </a:lnRef>
+          <a:fillRef idx="0">
+            <a:schemeClr val="accent1"/>
+          </a:fillRef>
+          <a:effectRef idx="0">
+            <a:schemeClr val="accent1"/>
+          </a:effectRef>
+          <a:fontRef idx="minor">
+            <a:schemeClr val="tx1"/>
+          </a:fontRef>
+        </p:style>
+      </p:cxnSp>
+      <p:cxnSp>
+        <p:nvCxnSpPr>
+          <p:cNvPr id="15" name="Straight Connector 14"/>
+          <p:cNvCxnSpPr/>
+          <p:nvPr/>
+        </p:nvCxnSpPr>
+        <p:spPr>
+          <a:xfrm rot="5400000" flipH="1" flipV="1">
+            <a:off x="2595686" y="3764576"/>
+            <a:ext cx="154719" cy="67784"/>
+          </a:xfrm>
+          <a:prstGeom prst="line">
+            <a:avLst/>
+          </a:prstGeom>
+          <a:ln w="28575">
+            <a:solidFill>
+              <a:schemeClr val="tx1"/>
+            </a:solidFill>
+          </a:ln>
+        </p:spPr>
+        <p:style>
+          <a:lnRef idx="1">
+            <a:schemeClr val="accent1"/>
+          </a:lnRef>
+          <a:fillRef idx="0">
+            <a:schemeClr val="accent1"/>
+          </a:fillRef>
+          <a:effectRef idx="0">
+            <a:schemeClr val="accent1"/>
+          </a:effectRef>
+          <a:fontRef idx="minor">
+            <a:schemeClr val="tx1"/>
+          </a:fontRef>
+        </p:style>
+      </p:cxnSp>
+      <p:cxnSp>
+        <p:nvCxnSpPr>
+          <p:cNvPr id="18" name="Straight Connector 17"/>
+          <p:cNvCxnSpPr/>
+          <p:nvPr/>
+        </p:nvCxnSpPr>
+        <p:spPr>
+          <a:xfrm rot="5400000" flipV="1">
+            <a:off x="1214375" y="3102786"/>
+            <a:ext cx="80387" cy="153347"/>
+          </a:xfrm>
+          <a:prstGeom prst="line">
+            <a:avLst/>
+          </a:prstGeom>
+          <a:ln w="28575">
+            <a:solidFill>
+              <a:schemeClr val="tx1"/>
+            </a:solidFill>
+          </a:ln>
+        </p:spPr>
+        <p:style>
+          <a:lnRef idx="1">
+            <a:schemeClr val="accent1"/>
+          </a:lnRef>
+          <a:fillRef idx="0">
+            <a:schemeClr val="accent1"/>
+          </a:fillRef>
+          <a:effectRef idx="0">
+            <a:schemeClr val="accent1"/>
+          </a:effectRef>
+          <a:fontRef idx="minor">
+            <a:schemeClr val="tx1"/>
+          </a:fontRef>
+        </p:style>
+      </p:cxnSp>
+      <p:cxnSp>
+        <p:nvCxnSpPr>
+          <p:cNvPr id="19" name="Straight Connector 18"/>
+          <p:cNvCxnSpPr/>
+          <p:nvPr/>
+        </p:nvCxnSpPr>
+        <p:spPr>
+          <a:xfrm rot="5400000" flipH="1" flipV="1">
+            <a:off x="1060626" y="3169546"/>
+            <a:ext cx="154719" cy="67784"/>
+          </a:xfrm>
+          <a:prstGeom prst="line">
+            <a:avLst/>
+          </a:prstGeom>
+          <a:ln w="28575">
+            <a:solidFill>
+              <a:schemeClr val="tx1"/>
+            </a:solidFill>
+          </a:ln>
+        </p:spPr>
+        <p:style>
+          <a:lnRef idx="1">
+            <a:schemeClr val="accent1"/>
+          </a:lnRef>
+          <a:fillRef idx="0">
+            <a:schemeClr val="accent1"/>
+          </a:fillRef>
+          <a:effectRef idx="0">
+            <a:schemeClr val="accent1"/>
+          </a:effectRef>
+          <a:fontRef idx="minor">
+            <a:schemeClr val="tx1"/>
+          </a:fontRef>
+        </p:style>
+      </p:cxnSp>
+      <p:cxnSp>
+        <p:nvCxnSpPr>
+          <p:cNvPr id="20" name="Straight Connector 19"/>
+          <p:cNvCxnSpPr/>
+          <p:nvPr/>
+        </p:nvCxnSpPr>
+        <p:spPr>
+          <a:xfrm rot="5400000" flipV="1">
+            <a:off x="1796955" y="1494300"/>
+            <a:ext cx="80387" cy="153347"/>
+          </a:xfrm>
+          <a:prstGeom prst="line">
+            <a:avLst/>
+          </a:prstGeom>
+          <a:ln w="28575">
+            <a:solidFill>
+              <a:schemeClr val="tx1"/>
+            </a:solidFill>
+          </a:ln>
+        </p:spPr>
+        <p:style>
+          <a:lnRef idx="1">
+            <a:schemeClr val="accent1"/>
+          </a:lnRef>
+          <a:fillRef idx="0">
+            <a:schemeClr val="accent1"/>
+          </a:fillRef>
+          <a:effectRef idx="0">
+            <a:schemeClr val="accent1"/>
+          </a:effectRef>
+          <a:fontRef idx="minor">
+            <a:schemeClr val="tx1"/>
+          </a:fontRef>
+        </p:style>
+      </p:cxnSp>
+      <p:cxnSp>
+        <p:nvCxnSpPr>
+          <p:cNvPr id="21" name="Straight Connector 20"/>
+          <p:cNvCxnSpPr/>
+          <p:nvPr/>
+        </p:nvCxnSpPr>
+        <p:spPr>
+          <a:xfrm rot="5400000" flipH="1" flipV="1">
+            <a:off x="1800599" y="1643522"/>
+            <a:ext cx="154719" cy="67784"/>
+          </a:xfrm>
+          <a:prstGeom prst="line">
+            <a:avLst/>
+          </a:prstGeom>
+          <a:ln w="28575">
+            <a:solidFill>
+              <a:schemeClr val="tx1"/>
+            </a:solidFill>
+          </a:ln>
+        </p:spPr>
+        <p:style>
+          <a:lnRef idx="1">
+            <a:schemeClr val="accent1"/>
+          </a:lnRef>
+          <a:fillRef idx="0">
+            <a:schemeClr val="accent1"/>
+          </a:fillRef>
+          <a:effectRef idx="0">
+            <a:schemeClr val="accent1"/>
+          </a:effectRef>
+          <a:fontRef idx="minor">
+            <a:schemeClr val="tx1"/>
+          </a:fontRef>
+        </p:style>
+      </p:cxnSp>
+    </p:spTree>
+    <p:extLst>
+      <p:ext uri="{BB962C8B-B14F-4D97-AF65-F5344CB8AC3E}">
+        <p14:creationId xmlns:p14="http://schemas.microsoft.com/office/powerpoint/2010/main" val="3451698572"/>
+      </p:ext>
+    </p:extLst>
+  </p:cSld>
+  <p:clrMapOvr>
+    <a:masterClrMapping/>
+  </p:clrMapOvr>
+</p:sld>
+</file>
+
 <file path=ppt/theme/theme1.xml><?xml version="1.0" encoding="utf-8"?>
 <a:theme xmlns:a="http://schemas.openxmlformats.org/drawingml/2006/main" name="Office Theme">
   <a:themeElements>

</xml_diff>

<commit_message>
Added more EDA figures.
</commit_message>
<xml_diff>
--- a/Kate/diagrams.pptx
+++ b/Kate/diagrams.pptx
@@ -246,7 +246,7 @@
           <a:p>
             <a:fld id="{1A01868C-B13A-47E7-85E7-2E63E1B5F28E}" type="datetimeFigureOut">
               <a:rPr lang="en-US" smtClean="0"/>
-              <a:t>10/28/2025</a:t>
+              <a:t>11/3/2025</a:t>
             </a:fld>
             <a:endParaRPr lang="en-US"/>
           </a:p>
@@ -416,7 +416,7 @@
           <a:p>
             <a:fld id="{1A01868C-B13A-47E7-85E7-2E63E1B5F28E}" type="datetimeFigureOut">
               <a:rPr lang="en-US" smtClean="0"/>
-              <a:t>10/28/2025</a:t>
+              <a:t>11/3/2025</a:t>
             </a:fld>
             <a:endParaRPr lang="en-US"/>
           </a:p>
@@ -596,7 +596,7 @@
           <a:p>
             <a:fld id="{1A01868C-B13A-47E7-85E7-2E63E1B5F28E}" type="datetimeFigureOut">
               <a:rPr lang="en-US" smtClean="0"/>
-              <a:t>10/28/2025</a:t>
+              <a:t>11/3/2025</a:t>
             </a:fld>
             <a:endParaRPr lang="en-US"/>
           </a:p>
@@ -766,7 +766,7 @@
           <a:p>
             <a:fld id="{1A01868C-B13A-47E7-85E7-2E63E1B5F28E}" type="datetimeFigureOut">
               <a:rPr lang="en-US" smtClean="0"/>
-              <a:t>10/28/2025</a:t>
+              <a:t>11/3/2025</a:t>
             </a:fld>
             <a:endParaRPr lang="en-US"/>
           </a:p>
@@ -1010,7 +1010,7 @@
           <a:p>
             <a:fld id="{1A01868C-B13A-47E7-85E7-2E63E1B5F28E}" type="datetimeFigureOut">
               <a:rPr lang="en-US" smtClean="0"/>
-              <a:t>10/28/2025</a:t>
+              <a:t>11/3/2025</a:t>
             </a:fld>
             <a:endParaRPr lang="en-US"/>
           </a:p>
@@ -1242,7 +1242,7 @@
           <a:p>
             <a:fld id="{1A01868C-B13A-47E7-85E7-2E63E1B5F28E}" type="datetimeFigureOut">
               <a:rPr lang="en-US" smtClean="0"/>
-              <a:t>10/28/2025</a:t>
+              <a:t>11/3/2025</a:t>
             </a:fld>
             <a:endParaRPr lang="en-US"/>
           </a:p>
@@ -1609,7 +1609,7 @@
           <a:p>
             <a:fld id="{1A01868C-B13A-47E7-85E7-2E63E1B5F28E}" type="datetimeFigureOut">
               <a:rPr lang="en-US" smtClean="0"/>
-              <a:t>10/28/2025</a:t>
+              <a:t>11/3/2025</a:t>
             </a:fld>
             <a:endParaRPr lang="en-US"/>
           </a:p>
@@ -1727,7 +1727,7 @@
           <a:p>
             <a:fld id="{1A01868C-B13A-47E7-85E7-2E63E1B5F28E}" type="datetimeFigureOut">
               <a:rPr lang="en-US" smtClean="0"/>
-              <a:t>10/28/2025</a:t>
+              <a:t>11/3/2025</a:t>
             </a:fld>
             <a:endParaRPr lang="en-US"/>
           </a:p>
@@ -1822,7 +1822,7 @@
           <a:p>
             <a:fld id="{1A01868C-B13A-47E7-85E7-2E63E1B5F28E}" type="datetimeFigureOut">
               <a:rPr lang="en-US" smtClean="0"/>
-              <a:t>10/28/2025</a:t>
+              <a:t>11/3/2025</a:t>
             </a:fld>
             <a:endParaRPr lang="en-US"/>
           </a:p>
@@ -2099,7 +2099,7 @@
           <a:p>
             <a:fld id="{1A01868C-B13A-47E7-85E7-2E63E1B5F28E}" type="datetimeFigureOut">
               <a:rPr lang="en-US" smtClean="0"/>
-              <a:t>10/28/2025</a:t>
+              <a:t>11/3/2025</a:t>
             </a:fld>
             <a:endParaRPr lang="en-US"/>
           </a:p>
@@ -2356,7 +2356,7 @@
           <a:p>
             <a:fld id="{1A01868C-B13A-47E7-85E7-2E63E1B5F28E}" type="datetimeFigureOut">
               <a:rPr lang="en-US" smtClean="0"/>
-              <a:t>10/28/2025</a:t>
+              <a:t>11/3/2025</a:t>
             </a:fld>
             <a:endParaRPr lang="en-US"/>
           </a:p>
@@ -2569,7 +2569,7 @@
           <a:p>
             <a:fld id="{1A01868C-B13A-47E7-85E7-2E63E1B5F28E}" type="datetimeFigureOut">
               <a:rPr lang="en-US" smtClean="0"/>
-              <a:t>10/28/2025</a:t>
+              <a:t>11/3/2025</a:t>
             </a:fld>
             <a:endParaRPr lang="en-US"/>
           </a:p>
@@ -4129,6 +4129,150 @@
           </a:fontRef>
         </p:style>
       </p:cxnSp>
+      <p:sp>
+        <p:nvSpPr>
+          <p:cNvPr id="2" name="Isosceles Triangle 1"/>
+          <p:cNvSpPr/>
+          <p:nvPr/>
+        </p:nvSpPr>
+        <p:spPr>
+          <a:xfrm rot="3397978">
+            <a:off x="2481943" y="1071821"/>
+            <a:ext cx="221064" cy="174171"/>
+          </a:xfrm>
+          <a:prstGeom prst="triangle">
+            <a:avLst/>
+          </a:prstGeom>
+          <a:solidFill>
+            <a:schemeClr val="tx1"/>
+          </a:solidFill>
+          <a:ln>
+            <a:solidFill>
+              <a:schemeClr val="tx1"/>
+            </a:solidFill>
+          </a:ln>
+        </p:spPr>
+        <p:style>
+          <a:lnRef idx="2">
+            <a:schemeClr val="accent1">
+              <a:shade val="50000"/>
+            </a:schemeClr>
+          </a:lnRef>
+          <a:fillRef idx="1">
+            <a:schemeClr val="accent1"/>
+          </a:fillRef>
+          <a:effectRef idx="0">
+            <a:schemeClr val="accent1"/>
+          </a:effectRef>
+          <a:fontRef idx="minor">
+            <a:schemeClr val="lt1"/>
+          </a:fontRef>
+        </p:style>
+        <p:txBody>
+          <a:bodyPr rtlCol="0" anchor="ctr"/>
+          <a:lstStyle/>
+          <a:p>
+            <a:pPr algn="ctr"/>
+            <a:endParaRPr lang="en-US"/>
+          </a:p>
+        </p:txBody>
+      </p:sp>
+      <p:sp>
+        <p:nvSpPr>
+          <p:cNvPr id="11" name="Isosceles Triangle 10"/>
+          <p:cNvSpPr/>
+          <p:nvPr/>
+        </p:nvSpPr>
+        <p:spPr>
+          <a:xfrm rot="7362537">
+            <a:off x="2481423" y="3789899"/>
+            <a:ext cx="221064" cy="174171"/>
+          </a:xfrm>
+          <a:prstGeom prst="triangle">
+            <a:avLst/>
+          </a:prstGeom>
+          <a:solidFill>
+            <a:schemeClr val="tx1"/>
+          </a:solidFill>
+          <a:ln>
+            <a:solidFill>
+              <a:schemeClr val="tx1"/>
+            </a:solidFill>
+          </a:ln>
+        </p:spPr>
+        <p:style>
+          <a:lnRef idx="2">
+            <a:schemeClr val="accent1">
+              <a:shade val="50000"/>
+            </a:schemeClr>
+          </a:lnRef>
+          <a:fillRef idx="1">
+            <a:schemeClr val="accent1"/>
+          </a:fillRef>
+          <a:effectRef idx="0">
+            <a:schemeClr val="accent1"/>
+          </a:effectRef>
+          <a:fontRef idx="minor">
+            <a:schemeClr val="lt1"/>
+          </a:fontRef>
+        </p:style>
+        <p:txBody>
+          <a:bodyPr rtlCol="0" anchor="ctr"/>
+          <a:lstStyle/>
+          <a:p>
+            <a:pPr algn="ctr"/>
+            <a:endParaRPr lang="en-US"/>
+          </a:p>
+        </p:txBody>
+      </p:sp>
+      <p:sp>
+        <p:nvSpPr>
+          <p:cNvPr id="13" name="Isosceles Triangle 12"/>
+          <p:cNvSpPr/>
+          <p:nvPr/>
+        </p:nvSpPr>
+        <p:spPr>
+          <a:xfrm rot="5400000">
+            <a:off x="2461328" y="2337088"/>
+            <a:ext cx="221064" cy="174171"/>
+          </a:xfrm>
+          <a:prstGeom prst="triangle">
+            <a:avLst/>
+          </a:prstGeom>
+          <a:solidFill>
+            <a:schemeClr val="tx1"/>
+          </a:solidFill>
+          <a:ln>
+            <a:solidFill>
+              <a:schemeClr val="tx1"/>
+            </a:solidFill>
+          </a:ln>
+        </p:spPr>
+        <p:style>
+          <a:lnRef idx="2">
+            <a:schemeClr val="accent1">
+              <a:shade val="50000"/>
+            </a:schemeClr>
+          </a:lnRef>
+          <a:fillRef idx="1">
+            <a:schemeClr val="accent1"/>
+          </a:fillRef>
+          <a:effectRef idx="0">
+            <a:schemeClr val="accent1"/>
+          </a:effectRef>
+          <a:fontRef idx="minor">
+            <a:schemeClr val="lt1"/>
+          </a:fontRef>
+        </p:style>
+        <p:txBody>
+          <a:bodyPr rtlCol="0" anchor="ctr"/>
+          <a:lstStyle/>
+          <a:p>
+            <a:pPr algn="ctr"/>
+            <a:endParaRPr lang="en-US"/>
+          </a:p>
+        </p:txBody>
+      </p:sp>
     </p:spTree>
     <p:extLst>
       <p:ext uri="{BB962C8B-B14F-4D97-AF65-F5344CB8AC3E}">
@@ -4255,7 +4399,7 @@
         </p:nvSpPr>
         <p:spPr>
           <a:xfrm>
-            <a:off x="828990" y="2237432"/>
+            <a:off x="828990" y="2257526"/>
             <a:ext cx="770374" cy="770374"/>
           </a:xfrm>
           <a:prstGeom prst="ellipse">
@@ -4387,7 +4531,7 @@
         </p:nvCxnSpPr>
         <p:spPr>
           <a:xfrm flipV="1">
-            <a:off x="1599364" y="2622618"/>
+            <a:off x="1599364" y="2642712"/>
             <a:ext cx="1411794" cy="1"/>
           </a:xfrm>
           <a:prstGeom prst="straightConnector1">
@@ -4451,6 +4595,150 @@
           </a:fontRef>
         </p:style>
       </p:cxnSp>
+      <p:sp>
+        <p:nvSpPr>
+          <p:cNvPr id="11" name="Isosceles Triangle 10"/>
+          <p:cNvSpPr/>
+          <p:nvPr/>
+        </p:nvSpPr>
+        <p:spPr>
+          <a:xfrm rot="7253540">
+            <a:off x="2877387" y="2286151"/>
+            <a:ext cx="221064" cy="174171"/>
+          </a:xfrm>
+          <a:prstGeom prst="triangle">
+            <a:avLst/>
+          </a:prstGeom>
+          <a:solidFill>
+            <a:schemeClr val="tx1"/>
+          </a:solidFill>
+          <a:ln>
+            <a:solidFill>
+              <a:schemeClr val="tx1"/>
+            </a:solidFill>
+          </a:ln>
+        </p:spPr>
+        <p:style>
+          <a:lnRef idx="2">
+            <a:schemeClr val="accent1">
+              <a:shade val="50000"/>
+            </a:schemeClr>
+          </a:lnRef>
+          <a:fillRef idx="1">
+            <a:schemeClr val="accent1"/>
+          </a:fillRef>
+          <a:effectRef idx="0">
+            <a:schemeClr val="accent1"/>
+          </a:effectRef>
+          <a:fontRef idx="minor">
+            <a:schemeClr val="lt1"/>
+          </a:fontRef>
+        </p:style>
+        <p:txBody>
+          <a:bodyPr rtlCol="0" anchor="ctr"/>
+          <a:lstStyle/>
+          <a:p>
+            <a:pPr algn="ctr"/>
+            <a:endParaRPr lang="en-US"/>
+          </a:p>
+        </p:txBody>
+      </p:sp>
+      <p:sp>
+        <p:nvSpPr>
+          <p:cNvPr id="13" name="Isosceles Triangle 12"/>
+          <p:cNvSpPr/>
+          <p:nvPr/>
+        </p:nvSpPr>
+        <p:spPr>
+          <a:xfrm rot="3072945">
+            <a:off x="2933592" y="2890867"/>
+            <a:ext cx="221064" cy="174171"/>
+          </a:xfrm>
+          <a:prstGeom prst="triangle">
+            <a:avLst/>
+          </a:prstGeom>
+          <a:solidFill>
+            <a:schemeClr val="tx1"/>
+          </a:solidFill>
+          <a:ln>
+            <a:solidFill>
+              <a:schemeClr val="tx1"/>
+            </a:solidFill>
+          </a:ln>
+        </p:spPr>
+        <p:style>
+          <a:lnRef idx="2">
+            <a:schemeClr val="accent1">
+              <a:shade val="50000"/>
+            </a:schemeClr>
+          </a:lnRef>
+          <a:fillRef idx="1">
+            <a:schemeClr val="accent1"/>
+          </a:fillRef>
+          <a:effectRef idx="0">
+            <a:schemeClr val="accent1"/>
+          </a:effectRef>
+          <a:fontRef idx="minor">
+            <a:schemeClr val="lt1"/>
+          </a:fontRef>
+        </p:style>
+        <p:txBody>
+          <a:bodyPr rtlCol="0" anchor="ctr"/>
+          <a:lstStyle/>
+          <a:p>
+            <a:pPr algn="ctr"/>
+            <a:endParaRPr lang="en-US"/>
+          </a:p>
+        </p:txBody>
+      </p:sp>
+      <p:sp>
+        <p:nvSpPr>
+          <p:cNvPr id="15" name="Isosceles Triangle 14"/>
+          <p:cNvSpPr/>
+          <p:nvPr/>
+        </p:nvSpPr>
+        <p:spPr>
+          <a:xfrm rot="5400000">
+            <a:off x="2810191" y="2556341"/>
+            <a:ext cx="221064" cy="174171"/>
+          </a:xfrm>
+          <a:prstGeom prst="triangle">
+            <a:avLst/>
+          </a:prstGeom>
+          <a:solidFill>
+            <a:schemeClr val="tx1"/>
+          </a:solidFill>
+          <a:ln>
+            <a:solidFill>
+              <a:schemeClr val="tx1"/>
+            </a:solidFill>
+          </a:ln>
+        </p:spPr>
+        <p:style>
+          <a:lnRef idx="2">
+            <a:schemeClr val="accent1">
+              <a:shade val="50000"/>
+            </a:schemeClr>
+          </a:lnRef>
+          <a:fillRef idx="1">
+            <a:schemeClr val="accent1"/>
+          </a:fillRef>
+          <a:effectRef idx="0">
+            <a:schemeClr val="accent1"/>
+          </a:effectRef>
+          <a:fontRef idx="minor">
+            <a:schemeClr val="lt1"/>
+          </a:fontRef>
+        </p:style>
+        <p:txBody>
+          <a:bodyPr rtlCol="0" anchor="ctr"/>
+          <a:lstStyle/>
+          <a:p>
+            <a:pPr algn="ctr"/>
+            <a:endParaRPr lang="en-US"/>
+          </a:p>
+        </p:txBody>
+      </p:sp>
     </p:spTree>
     <p:extLst>
       <p:ext uri="{BB962C8B-B14F-4D97-AF65-F5344CB8AC3E}">

</xml_diff>